<commit_message>
Update session 34 documents.
</commit_message>
<xml_diff>
--- a/CPSC-24700/Presentations/session-34.pptx
+++ b/CPSC-24700/Presentations/session-34.pptx
@@ -5,13 +5,16 @@
     <p:sldMasterId id="2147483648" r:id="rId1"/>
   </p:sldMasterIdLst>
   <p:notesMasterIdLst>
-    <p:notesMasterId r:id="rId6"/>
+    <p:notesMasterId r:id="rId9"/>
   </p:notesMasterIdLst>
   <p:sldIdLst>
     <p:sldId id="257" r:id="rId2"/>
     <p:sldId id="301" r:id="rId3"/>
     <p:sldId id="299" r:id="rId4"/>
-    <p:sldId id="263" r:id="rId5"/>
+    <p:sldId id="303" r:id="rId5"/>
+    <p:sldId id="304" r:id="rId6"/>
+    <p:sldId id="302" r:id="rId7"/>
+    <p:sldId id="263" r:id="rId8"/>
   </p:sldIdLst>
   <p:sldSz cx="12192000" cy="6858000"/>
   <p:notesSz cx="7315200" cy="9601200"/>
@@ -118,6 +121,10 @@
 </p:presentation>
 </file>
 
+<file path=ppt/revisionInfo.xml><?xml version="1.0" encoding="utf-8"?>
+<p1510:revInfo xmlns:a="http://schemas.openxmlformats.org/drawingml/2006/main" xmlns:r="http://schemas.openxmlformats.org/officeDocument/2006/relationships" xmlns:p1510="http://schemas.microsoft.com/office/powerpoint/2015/10/main"/>
+</file>
+
 <file path=ppt/notesMasters/notesMaster1.xml><?xml version="1.0" encoding="utf-8"?>
 <p:notesMaster xmlns:a="http://schemas.openxmlformats.org/drawingml/2006/main" xmlns:r="http://schemas.openxmlformats.org/officeDocument/2006/relationships" xmlns:p="http://schemas.openxmlformats.org/presentationml/2006/main">
   <p:cSld>
@@ -200,7 +207,7 @@
           <a:p>
             <a:fld id="{1CF91C02-A59E-4778-8D4F-4840DBBEFA68}" type="datetimeFigureOut">
               <a:rPr lang="en-US" smtClean="0"/>
-              <a:t>11/16/2017</a:t>
+              <a:t>11/17/2017</a:t>
             </a:fld>
             <a:endParaRPr lang="en-US"/>
           </a:p>
@@ -793,6 +800,258 @@
     </p:spTree>
     <p:extLst>
       <p:ext uri="{BB962C8B-B14F-4D97-AF65-F5344CB8AC3E}">
+        <p14:creationId xmlns:p14="http://schemas.microsoft.com/office/powerpoint/2010/main" val="3864198591"/>
+      </p:ext>
+    </p:extLst>
+  </p:cSld>
+  <p:clrMapOvr>
+    <a:masterClrMapping/>
+  </p:clrMapOvr>
+</p:notes>
+</file>
+
+<file path=ppt/notesSlides/notesSlide5.xml><?xml version="1.0" encoding="utf-8"?>
+<p:notes xmlns:a="http://schemas.openxmlformats.org/drawingml/2006/main" xmlns:r="http://schemas.openxmlformats.org/officeDocument/2006/relationships" xmlns:p="http://schemas.openxmlformats.org/presentationml/2006/main">
+  <p:cSld>
+    <p:spTree>
+      <p:nvGrpSpPr>
+        <p:cNvPr id="1" name=""/>
+        <p:cNvGrpSpPr/>
+        <p:nvPr/>
+      </p:nvGrpSpPr>
+      <p:grpSpPr>
+        <a:xfrm>
+          <a:off x="0" y="0"/>
+          <a:ext cx="0" cy="0"/>
+          <a:chOff x="0" y="0"/>
+          <a:chExt cx="0" cy="0"/>
+        </a:xfrm>
+      </p:grpSpPr>
+      <p:sp>
+        <p:nvSpPr>
+          <p:cNvPr id="2" name="Slide Image Placeholder 1"/>
+          <p:cNvSpPr>
+            <a:spLocks noGrp="1" noRot="1" noChangeAspect="1"/>
+          </p:cNvSpPr>
+          <p:nvPr>
+            <p:ph type="sldImg"/>
+          </p:nvPr>
+        </p:nvSpPr>
+        <p:spPr/>
+      </p:sp>
+      <p:sp>
+        <p:nvSpPr>
+          <p:cNvPr id="3" name="Notes Placeholder 2"/>
+          <p:cNvSpPr>
+            <a:spLocks noGrp="1"/>
+          </p:cNvSpPr>
+          <p:nvPr>
+            <p:ph type="body" idx="1"/>
+          </p:nvPr>
+        </p:nvSpPr>
+        <p:spPr/>
+        <p:txBody>
+          <a:bodyPr/>
+          <a:lstStyle/>
+          <a:p>
+            <a:endParaRPr lang="en-US" dirty="0"/>
+          </a:p>
+        </p:txBody>
+      </p:sp>
+      <p:sp>
+        <p:nvSpPr>
+          <p:cNvPr id="4" name="Slide Number Placeholder 3"/>
+          <p:cNvSpPr>
+            <a:spLocks noGrp="1"/>
+          </p:cNvSpPr>
+          <p:nvPr>
+            <p:ph type="sldNum" sz="quarter" idx="10"/>
+          </p:nvPr>
+        </p:nvSpPr>
+        <p:spPr/>
+        <p:txBody>
+          <a:bodyPr/>
+          <a:lstStyle/>
+          <a:p>
+            <a:fld id="{5394DE12-7B9B-46AA-AC19-C30A49928B9B}" type="slidenum">
+              <a:rPr lang="en-US" smtClean="0"/>
+              <a:t>5</a:t>
+            </a:fld>
+            <a:endParaRPr lang="en-US" dirty="0"/>
+          </a:p>
+        </p:txBody>
+      </p:sp>
+    </p:spTree>
+    <p:extLst>
+      <p:ext uri="{BB962C8B-B14F-4D97-AF65-F5344CB8AC3E}">
+        <p14:creationId xmlns:p14="http://schemas.microsoft.com/office/powerpoint/2010/main" val="2139572274"/>
+      </p:ext>
+    </p:extLst>
+  </p:cSld>
+  <p:clrMapOvr>
+    <a:masterClrMapping/>
+  </p:clrMapOvr>
+</p:notes>
+</file>
+
+<file path=ppt/notesSlides/notesSlide6.xml><?xml version="1.0" encoding="utf-8"?>
+<p:notes xmlns:a="http://schemas.openxmlformats.org/drawingml/2006/main" xmlns:r="http://schemas.openxmlformats.org/officeDocument/2006/relationships" xmlns:p="http://schemas.openxmlformats.org/presentationml/2006/main">
+  <p:cSld>
+    <p:spTree>
+      <p:nvGrpSpPr>
+        <p:cNvPr id="1" name=""/>
+        <p:cNvGrpSpPr/>
+        <p:nvPr/>
+      </p:nvGrpSpPr>
+      <p:grpSpPr>
+        <a:xfrm>
+          <a:off x="0" y="0"/>
+          <a:ext cx="0" cy="0"/>
+          <a:chOff x="0" y="0"/>
+          <a:chExt cx="0" cy="0"/>
+        </a:xfrm>
+      </p:grpSpPr>
+      <p:sp>
+        <p:nvSpPr>
+          <p:cNvPr id="2" name="Slide Image Placeholder 1"/>
+          <p:cNvSpPr>
+            <a:spLocks noGrp="1" noRot="1" noChangeAspect="1"/>
+          </p:cNvSpPr>
+          <p:nvPr>
+            <p:ph type="sldImg"/>
+          </p:nvPr>
+        </p:nvSpPr>
+        <p:spPr/>
+      </p:sp>
+      <p:sp>
+        <p:nvSpPr>
+          <p:cNvPr id="3" name="Notes Placeholder 2"/>
+          <p:cNvSpPr>
+            <a:spLocks noGrp="1"/>
+          </p:cNvSpPr>
+          <p:nvPr>
+            <p:ph type="body" idx="1"/>
+          </p:nvPr>
+        </p:nvSpPr>
+        <p:spPr/>
+        <p:txBody>
+          <a:bodyPr/>
+          <a:lstStyle/>
+          <a:p>
+            <a:endParaRPr lang="en-US" dirty="0"/>
+          </a:p>
+        </p:txBody>
+      </p:sp>
+      <p:sp>
+        <p:nvSpPr>
+          <p:cNvPr id="4" name="Slide Number Placeholder 3"/>
+          <p:cNvSpPr>
+            <a:spLocks noGrp="1"/>
+          </p:cNvSpPr>
+          <p:nvPr>
+            <p:ph type="sldNum" sz="quarter" idx="10"/>
+          </p:nvPr>
+        </p:nvSpPr>
+        <p:spPr/>
+        <p:txBody>
+          <a:bodyPr/>
+          <a:lstStyle/>
+          <a:p>
+            <a:fld id="{5394DE12-7B9B-46AA-AC19-C30A49928B9B}" type="slidenum">
+              <a:rPr lang="en-US" smtClean="0"/>
+              <a:t>6</a:t>
+            </a:fld>
+            <a:endParaRPr lang="en-US" dirty="0"/>
+          </a:p>
+        </p:txBody>
+      </p:sp>
+    </p:spTree>
+    <p:extLst>
+      <p:ext uri="{BB962C8B-B14F-4D97-AF65-F5344CB8AC3E}">
+        <p14:creationId xmlns:p14="http://schemas.microsoft.com/office/powerpoint/2010/main" val="653995840"/>
+      </p:ext>
+    </p:extLst>
+  </p:cSld>
+  <p:clrMapOvr>
+    <a:masterClrMapping/>
+  </p:clrMapOvr>
+</p:notes>
+</file>
+
+<file path=ppt/notesSlides/notesSlide7.xml><?xml version="1.0" encoding="utf-8"?>
+<p:notes xmlns:a="http://schemas.openxmlformats.org/drawingml/2006/main" xmlns:r="http://schemas.openxmlformats.org/officeDocument/2006/relationships" xmlns:p="http://schemas.openxmlformats.org/presentationml/2006/main">
+  <p:cSld>
+    <p:spTree>
+      <p:nvGrpSpPr>
+        <p:cNvPr id="1" name=""/>
+        <p:cNvGrpSpPr/>
+        <p:nvPr/>
+      </p:nvGrpSpPr>
+      <p:grpSpPr>
+        <a:xfrm>
+          <a:off x="0" y="0"/>
+          <a:ext cx="0" cy="0"/>
+          <a:chOff x="0" y="0"/>
+          <a:chExt cx="0" cy="0"/>
+        </a:xfrm>
+      </p:grpSpPr>
+      <p:sp>
+        <p:nvSpPr>
+          <p:cNvPr id="2" name="Slide Image Placeholder 1"/>
+          <p:cNvSpPr>
+            <a:spLocks noGrp="1" noRot="1" noChangeAspect="1"/>
+          </p:cNvSpPr>
+          <p:nvPr>
+            <p:ph type="sldImg"/>
+          </p:nvPr>
+        </p:nvSpPr>
+        <p:spPr/>
+      </p:sp>
+      <p:sp>
+        <p:nvSpPr>
+          <p:cNvPr id="3" name="Notes Placeholder 2"/>
+          <p:cNvSpPr>
+            <a:spLocks noGrp="1"/>
+          </p:cNvSpPr>
+          <p:nvPr>
+            <p:ph type="body" idx="1"/>
+          </p:nvPr>
+        </p:nvSpPr>
+        <p:spPr/>
+        <p:txBody>
+          <a:bodyPr/>
+          <a:lstStyle/>
+          <a:p>
+            <a:endParaRPr lang="en-US" dirty="0"/>
+          </a:p>
+        </p:txBody>
+      </p:sp>
+      <p:sp>
+        <p:nvSpPr>
+          <p:cNvPr id="4" name="Slide Number Placeholder 3"/>
+          <p:cNvSpPr>
+            <a:spLocks noGrp="1"/>
+          </p:cNvSpPr>
+          <p:nvPr>
+            <p:ph type="sldNum" sz="quarter" idx="10"/>
+          </p:nvPr>
+        </p:nvSpPr>
+        <p:spPr/>
+        <p:txBody>
+          <a:bodyPr/>
+          <a:lstStyle/>
+          <a:p>
+            <a:fld id="{5394DE12-7B9B-46AA-AC19-C30A49928B9B}" type="slidenum">
+              <a:rPr lang="en-US" smtClean="0"/>
+              <a:t>7</a:t>
+            </a:fld>
+            <a:endParaRPr lang="en-US" dirty="0"/>
+          </a:p>
+        </p:txBody>
+      </p:sp>
+    </p:spTree>
+    <p:extLst>
+      <p:ext uri="{BB962C8B-B14F-4D97-AF65-F5344CB8AC3E}">
         <p14:creationId xmlns:p14="http://schemas.microsoft.com/office/powerpoint/2010/main" val="3850776935"/>
       </p:ext>
     </p:extLst>
@@ -950,7 +1209,7 @@
           <a:p>
             <a:fld id="{5FB62F81-FD80-4AA8-93CA-E835B40BE667}" type="datetimeFigureOut">
               <a:rPr lang="en-US" smtClean="0"/>
-              <a:t>11/16/2017</a:t>
+              <a:t>11/17/2017</a:t>
             </a:fld>
             <a:endParaRPr lang="en-US"/>
           </a:p>
@@ -1148,7 +1407,7 @@
           <a:p>
             <a:fld id="{5FB62F81-FD80-4AA8-93CA-E835B40BE667}" type="datetimeFigureOut">
               <a:rPr lang="en-US" smtClean="0"/>
-              <a:t>11/16/2017</a:t>
+              <a:t>11/17/2017</a:t>
             </a:fld>
             <a:endParaRPr lang="en-US"/>
           </a:p>
@@ -1356,7 +1615,7 @@
           <a:p>
             <a:fld id="{5FB62F81-FD80-4AA8-93CA-E835B40BE667}" type="datetimeFigureOut">
               <a:rPr lang="en-US" smtClean="0"/>
-              <a:t>11/16/2017</a:t>
+              <a:t>11/17/2017</a:t>
             </a:fld>
             <a:endParaRPr lang="en-US"/>
           </a:p>
@@ -1554,7 +1813,7 @@
           <a:p>
             <a:fld id="{5FB62F81-FD80-4AA8-93CA-E835B40BE667}" type="datetimeFigureOut">
               <a:rPr lang="en-US" smtClean="0"/>
-              <a:t>11/16/2017</a:t>
+              <a:t>11/17/2017</a:t>
             </a:fld>
             <a:endParaRPr lang="en-US"/>
           </a:p>
@@ -1829,7 +2088,7 @@
           <a:p>
             <a:fld id="{5FB62F81-FD80-4AA8-93CA-E835B40BE667}" type="datetimeFigureOut">
               <a:rPr lang="en-US" smtClean="0"/>
-              <a:t>11/16/2017</a:t>
+              <a:t>11/17/2017</a:t>
             </a:fld>
             <a:endParaRPr lang="en-US"/>
           </a:p>
@@ -2094,7 +2353,7 @@
           <a:p>
             <a:fld id="{5FB62F81-FD80-4AA8-93CA-E835B40BE667}" type="datetimeFigureOut">
               <a:rPr lang="en-US" smtClean="0"/>
-              <a:t>11/16/2017</a:t>
+              <a:t>11/17/2017</a:t>
             </a:fld>
             <a:endParaRPr lang="en-US"/>
           </a:p>
@@ -2506,7 +2765,7 @@
           <a:p>
             <a:fld id="{5FB62F81-FD80-4AA8-93CA-E835B40BE667}" type="datetimeFigureOut">
               <a:rPr lang="en-US" smtClean="0"/>
-              <a:t>11/16/2017</a:t>
+              <a:t>11/17/2017</a:t>
             </a:fld>
             <a:endParaRPr lang="en-US"/>
           </a:p>
@@ -2647,7 +2906,7 @@
           <a:p>
             <a:fld id="{5FB62F81-FD80-4AA8-93CA-E835B40BE667}" type="datetimeFigureOut">
               <a:rPr lang="en-US" smtClean="0"/>
-              <a:t>11/16/2017</a:t>
+              <a:t>11/17/2017</a:t>
             </a:fld>
             <a:endParaRPr lang="en-US"/>
           </a:p>
@@ -2760,7 +3019,7 @@
           <a:p>
             <a:fld id="{5FB62F81-FD80-4AA8-93CA-E835B40BE667}" type="datetimeFigureOut">
               <a:rPr lang="en-US" smtClean="0"/>
-              <a:t>11/16/2017</a:t>
+              <a:t>11/17/2017</a:t>
             </a:fld>
             <a:endParaRPr lang="en-US"/>
           </a:p>
@@ -3071,7 +3330,7 @@
           <a:p>
             <a:fld id="{5FB62F81-FD80-4AA8-93CA-E835B40BE667}" type="datetimeFigureOut">
               <a:rPr lang="en-US" smtClean="0"/>
-              <a:t>11/16/2017</a:t>
+              <a:t>11/17/2017</a:t>
             </a:fld>
             <a:endParaRPr lang="en-US"/>
           </a:p>
@@ -3359,7 +3618,7 @@
           <a:p>
             <a:fld id="{5FB62F81-FD80-4AA8-93CA-E835B40BE667}" type="datetimeFigureOut">
               <a:rPr lang="en-US" smtClean="0"/>
-              <a:t>11/16/2017</a:t>
+              <a:t>11/17/2017</a:t>
             </a:fld>
             <a:endParaRPr lang="en-US"/>
           </a:p>
@@ -3600,7 +3859,7 @@
           <a:p>
             <a:fld id="{5FB62F81-FD80-4AA8-93CA-E835B40BE667}" type="datetimeFigureOut">
               <a:rPr lang="en-US" smtClean="0"/>
-              <a:t>11/16/2017</a:t>
+              <a:t>11/17/2017</a:t>
             </a:fld>
             <a:endParaRPr lang="en-US"/>
           </a:p>
@@ -4085,7 +4344,7 @@
         <p:spPr/>
         <p:txBody>
           <a:bodyPr>
-            <a:normAutofit/>
+            <a:normAutofit lnSpcReduction="10000"/>
           </a:bodyPr>
           <a:lstStyle/>
           <a:p>
@@ -4125,6 +4384,16 @@
             <a:r>
               <a:rPr lang="en-US" sz="2000" dirty="0"/>
               <a:t>Quick Review of Current Assignments</a:t>
+            </a:r>
+          </a:p>
+          <a:p>
+            <a:pPr marL="457200" indent="-457200">
+              <a:buFont typeface="+mj-lt"/>
+              <a:buAutoNum type="arabicPeriod"/>
+            </a:pPr>
+            <a:r>
+              <a:rPr lang="en-US" sz="2000" dirty="0"/>
+              <a:t>Microsoft Imagine program</a:t>
             </a:r>
           </a:p>
           <a:p>
@@ -4351,7 +4620,7 @@
             </a:pPr>
             <a:r>
               <a:rPr lang="en-US" sz="2000" u="sng" dirty="0"/>
-              <a:t>Assignment (before next class):</a:t>
+              <a:t>Assignment:</a:t>
             </a:r>
             <a:endParaRPr lang="en-US" sz="2000" dirty="0"/>
           </a:p>
@@ -4379,13 +4648,8 @@
             </a:pPr>
             <a:r>
               <a:rPr lang="en-US" sz="2000" dirty="0"/>
-              <a:t>	Week 12 Lab: </a:t>
-            </a:r>
-            <a:r>
-              <a:rPr lang="en-US" sz="2000"/>
-              <a:t>Static Website in Azure</a:t>
-            </a:r>
-            <a:endParaRPr lang="en-US" sz="2000" dirty="0"/>
+              <a:t>	Week 12 Lab: Static Website in Azure</a:t>
+            </a:r>
           </a:p>
           <a:p>
             <a:pPr marL="0" indent="0">
@@ -4393,7 +4657,7 @@
             </a:pPr>
             <a:r>
               <a:rPr lang="en-US" sz="2000" dirty="0"/>
-              <a:t>	Week 13 Lab: Create a </a:t>
+              <a:t>	Week 13a Lab: Create a </a:t>
             </a:r>
             <a:r>
               <a:rPr lang="nl-NL" sz="2000" dirty="0"/>
@@ -4458,7 +4722,7 @@
         <p:spPr>
           <a:xfrm>
             <a:off x="1524000" y="1122362"/>
-            <a:ext cx="9144000" cy="3333444"/>
+            <a:ext cx="9144000" cy="2807612"/>
           </a:xfrm>
         </p:spPr>
         <p:txBody>
@@ -4470,18 +4734,9 @@
             <a:br>
               <a:rPr lang="en-US" sz="4000" dirty="0"/>
             </a:br>
-            <a:br>
+            <a:r>
               <a:rPr lang="en-US" sz="4000" dirty="0"/>
-            </a:br>
-            <a:br>
-              <a:rPr lang="en-US" sz="4000" dirty="0"/>
-            </a:br>
-            <a:br>
-              <a:rPr lang="en-US" sz="4000" dirty="0"/>
-            </a:br>
-            <a:r>
-              <a:rPr lang="en-US" sz="4000" dirty="0"/>
-              <a:t>Week 12 &amp; 13 Labs</a:t>
+              <a:t>Demo</a:t>
             </a:r>
           </a:p>
         </p:txBody>
@@ -4500,6 +4755,199 @@
 </file>
 
 <file path=ppt/slides/slide4.xml><?xml version="1.0" encoding="utf-8"?>
+<p:sld xmlns:a="http://schemas.openxmlformats.org/drawingml/2006/main" xmlns:r="http://schemas.openxmlformats.org/officeDocument/2006/relationships" xmlns:p="http://schemas.openxmlformats.org/presentationml/2006/main">
+  <p:cSld>
+    <p:spTree>
+      <p:nvGrpSpPr>
+        <p:cNvPr id="1" name=""/>
+        <p:cNvGrpSpPr/>
+        <p:nvPr/>
+      </p:nvGrpSpPr>
+      <p:grpSpPr>
+        <a:xfrm>
+          <a:off x="0" y="0"/>
+          <a:ext cx="0" cy="0"/>
+          <a:chOff x="0" y="0"/>
+          <a:chExt cx="0" cy="0"/>
+        </a:xfrm>
+      </p:grpSpPr>
+      <p:sp>
+        <p:nvSpPr>
+          <p:cNvPr id="2" name="Title 1"/>
+          <p:cNvSpPr>
+            <a:spLocks noGrp="1"/>
+          </p:cNvSpPr>
+          <p:nvPr>
+            <p:ph type="ctrTitle"/>
+          </p:nvPr>
+        </p:nvSpPr>
+        <p:spPr>
+          <a:xfrm>
+            <a:off x="1524000" y="1122362"/>
+            <a:ext cx="9144000" cy="2807612"/>
+          </a:xfrm>
+        </p:spPr>
+        <p:txBody>
+          <a:bodyPr>
+            <a:noAutofit/>
+          </a:bodyPr>
+          <a:lstStyle/>
+          <a:p>
+            <a:br>
+              <a:rPr lang="en-US" sz="4000" dirty="0"/>
+            </a:br>
+            <a:r>
+              <a:rPr lang="en-US" sz="4000" dirty="0"/>
+              <a:t>Quiz Review</a:t>
+            </a:r>
+          </a:p>
+        </p:txBody>
+      </p:sp>
+    </p:spTree>
+    <p:extLst>
+      <p:ext uri="{BB962C8B-B14F-4D97-AF65-F5344CB8AC3E}">
+        <p14:creationId xmlns:p14="http://schemas.microsoft.com/office/powerpoint/2010/main" val="1078233511"/>
+      </p:ext>
+    </p:extLst>
+  </p:cSld>
+  <p:clrMapOvr>
+    <a:masterClrMapping/>
+  </p:clrMapOvr>
+</p:sld>
+</file>
+
+<file path=ppt/slides/slide5.xml><?xml version="1.0" encoding="utf-8"?>
+<p:sld xmlns:a="http://schemas.openxmlformats.org/drawingml/2006/main" xmlns:r="http://schemas.openxmlformats.org/officeDocument/2006/relationships" xmlns:p="http://schemas.openxmlformats.org/presentationml/2006/main">
+  <p:cSld>
+    <p:spTree>
+      <p:nvGrpSpPr>
+        <p:cNvPr id="1" name=""/>
+        <p:cNvGrpSpPr/>
+        <p:nvPr/>
+      </p:nvGrpSpPr>
+      <p:grpSpPr>
+        <a:xfrm>
+          <a:off x="0" y="0"/>
+          <a:ext cx="0" cy="0"/>
+          <a:chOff x="0" y="0"/>
+          <a:chExt cx="0" cy="0"/>
+        </a:xfrm>
+      </p:grpSpPr>
+      <p:sp>
+        <p:nvSpPr>
+          <p:cNvPr id="2" name="Title 1"/>
+          <p:cNvSpPr>
+            <a:spLocks noGrp="1"/>
+          </p:cNvSpPr>
+          <p:nvPr>
+            <p:ph type="ctrTitle"/>
+          </p:nvPr>
+        </p:nvSpPr>
+        <p:spPr>
+          <a:xfrm>
+            <a:off x="1524000" y="1122362"/>
+            <a:ext cx="9144000" cy="2807612"/>
+          </a:xfrm>
+        </p:spPr>
+        <p:txBody>
+          <a:bodyPr>
+            <a:noAutofit/>
+          </a:bodyPr>
+          <a:lstStyle/>
+          <a:p>
+            <a:br>
+              <a:rPr lang="en-US" sz="4000" dirty="0"/>
+            </a:br>
+            <a:r>
+              <a:rPr lang="en-US" sz="4000" dirty="0"/>
+              <a:t>Microsoft Imagine </a:t>
+            </a:r>
+            <a:r>
+              <a:rPr lang="en-US" sz="4000" dirty="0">
+                <a:hlinkClick r:id="rId3"/>
+              </a:rPr>
+              <a:t>[link]</a:t>
+            </a:r>
+            <a:endParaRPr lang="en-US" sz="4000" dirty="0"/>
+          </a:p>
+        </p:txBody>
+      </p:sp>
+    </p:spTree>
+    <p:extLst>
+      <p:ext uri="{BB962C8B-B14F-4D97-AF65-F5344CB8AC3E}">
+        <p14:creationId xmlns:p14="http://schemas.microsoft.com/office/powerpoint/2010/main" val="868102132"/>
+      </p:ext>
+    </p:extLst>
+  </p:cSld>
+  <p:clrMapOvr>
+    <a:masterClrMapping/>
+  </p:clrMapOvr>
+</p:sld>
+</file>
+
+<file path=ppt/slides/slide6.xml><?xml version="1.0" encoding="utf-8"?>
+<p:sld xmlns:a="http://schemas.openxmlformats.org/drawingml/2006/main" xmlns:r="http://schemas.openxmlformats.org/officeDocument/2006/relationships" xmlns:p="http://schemas.openxmlformats.org/presentationml/2006/main">
+  <p:cSld>
+    <p:spTree>
+      <p:nvGrpSpPr>
+        <p:cNvPr id="1" name=""/>
+        <p:cNvGrpSpPr/>
+        <p:nvPr/>
+      </p:nvGrpSpPr>
+      <p:grpSpPr>
+        <a:xfrm>
+          <a:off x="0" y="0"/>
+          <a:ext cx="0" cy="0"/>
+          <a:chOff x="0" y="0"/>
+          <a:chExt cx="0" cy="0"/>
+        </a:xfrm>
+      </p:grpSpPr>
+      <p:sp>
+        <p:nvSpPr>
+          <p:cNvPr id="2" name="Title 1"/>
+          <p:cNvSpPr>
+            <a:spLocks noGrp="1"/>
+          </p:cNvSpPr>
+          <p:nvPr>
+            <p:ph type="ctrTitle"/>
+          </p:nvPr>
+        </p:nvSpPr>
+        <p:spPr>
+          <a:xfrm>
+            <a:off x="1524000" y="1122362"/>
+            <a:ext cx="9144000" cy="2807612"/>
+          </a:xfrm>
+        </p:spPr>
+        <p:txBody>
+          <a:bodyPr>
+            <a:noAutofit/>
+          </a:bodyPr>
+          <a:lstStyle/>
+          <a:p>
+            <a:br>
+              <a:rPr lang="en-US" sz="4000" dirty="0"/>
+            </a:br>
+            <a:r>
+              <a:rPr lang="en-US" sz="4000" dirty="0"/>
+              <a:t>Week 12 &amp; 13 Labs</a:t>
+            </a:r>
+          </a:p>
+        </p:txBody>
+      </p:sp>
+    </p:spTree>
+    <p:extLst>
+      <p:ext uri="{BB962C8B-B14F-4D97-AF65-F5344CB8AC3E}">
+        <p14:creationId xmlns:p14="http://schemas.microsoft.com/office/powerpoint/2010/main" val="3676010372"/>
+      </p:ext>
+    </p:extLst>
+  </p:cSld>
+  <p:clrMapOvr>
+    <a:masterClrMapping/>
+  </p:clrMapOvr>
+</p:sld>
+</file>
+
+<file path=ppt/slides/slide7.xml><?xml version="1.0" encoding="utf-8"?>
 <p:sld xmlns:a="http://schemas.openxmlformats.org/drawingml/2006/main" xmlns:r="http://schemas.openxmlformats.org/officeDocument/2006/relationships" xmlns:p="http://schemas.openxmlformats.org/presentationml/2006/main">
   <p:cSld>
     <p:bg>

</xml_diff>